<commit_message>
ajustando material de apoio
</commit_message>
<xml_diff>
--- a/#00 - Material de Apoio/00 - Fundamentos de C#/02 - Frameworks/PPTs/03 - .NET Core.pptx
+++ b/#00 - Material de Apoio/00 - Fundamentos de C#/02 - Frameworks/PPTs/03 - .NET Core.pptx
@@ -199,7 +199,7 @@
           <a:p>
             <a:fld id="{139EEEC3-02C9-4141-B0CF-4C776CBE4D81}" type="datetimeFigureOut">
               <a:rPr lang="pt-BR" smtClean="0"/>
-              <a:t>15/03/2021</a:t>
+              <a:t>13/04/2021</a:t>
             </a:fld>
             <a:endParaRPr lang="pt-BR"/>
           </a:p>
@@ -606,7 +606,7 @@
           <a:p>
             <a:fld id="{1D8BD707-D9CF-40AE-B4C6-C98DA3205C09}" type="datetimeFigureOut">
               <a:rPr lang="en-US"/>
-              <a:t>3/15/2021</a:t>
+              <a:t>4/13/2021</a:t>
             </a:fld>
             <a:endParaRPr lang="en-US"/>
           </a:p>
@@ -777,7 +777,7 @@
           <a:p>
             <a:fld id="{1D8BD707-D9CF-40AE-B4C6-C98DA3205C09}" type="datetimeFigureOut">
               <a:rPr lang="en-US"/>
-              <a:t>3/15/2021</a:t>
+              <a:t>4/13/2021</a:t>
             </a:fld>
             <a:endParaRPr lang="en-US"/>
           </a:p>
@@ -991,7 +991,7 @@
           <a:p>
             <a:fld id="{1D8BD707-D9CF-40AE-B4C6-C98DA3205C09}" type="datetimeFigureOut">
               <a:rPr lang="en-US"/>
-              <a:t>3/15/2021</a:t>
+              <a:t>4/13/2021</a:t>
             </a:fld>
             <a:endParaRPr lang="en-US"/>
           </a:p>
@@ -1234,7 +1234,7 @@
           <a:p>
             <a:fld id="{1D8BD707-D9CF-40AE-B4C6-C98DA3205C09}" type="datetimeFigureOut">
               <a:rPr lang="en-US"/>
-              <a:t>3/15/2021</a:t>
+              <a:t>4/13/2021</a:t>
             </a:fld>
             <a:endParaRPr lang="en-US"/>
           </a:p>
@@ -1353,7 +1353,7 @@
           <a:p>
             <a:fld id="{1D8BD707-D9CF-40AE-B4C6-C98DA3205C09}" type="datetimeFigureOut">
               <a:rPr lang="en-US"/>
-              <a:t>3/15/2021</a:t>
+              <a:t>4/13/2021</a:t>
             </a:fld>
             <a:endParaRPr lang="en-US"/>
           </a:p>
@@ -1688,7 +1688,7 @@
           <a:p>
             <a:fld id="{1D8BD707-D9CF-40AE-B4C6-C98DA3205C09}" type="datetimeFigureOut">
               <a:rPr lang="en-US"/>
-              <a:t>3/15/2021</a:t>
+              <a:t>4/13/2021</a:t>
             </a:fld>
             <a:endParaRPr lang="en-US"/>
           </a:p>
@@ -4197,8 +4197,35 @@
                 <a:latin typeface="Arial"/>
                 <a:cs typeface="Arial"/>
               </a:rPr>
-              <a:t>Visão geral do .NET Framework:</a:t>
-            </a:r>
+              <a:t>Visão geral do .</a:t>
+            </a:r>
+            <a:r>
+              <a:rPr lang="pt-BR" sz="4000" b="1" kern="0" spc="180">
+                <a:solidFill>
+                  <a:schemeClr val="tx1"/>
+                </a:solidFill>
+                <a:latin typeface="Arial"/>
+                <a:cs typeface="Arial"/>
+              </a:rPr>
+              <a:t>NET </a:t>
+            </a:r>
+            <a:r>
+              <a:rPr lang="pt-BR" sz="4000" b="1" kern="0" spc="180" smtClean="0">
+                <a:solidFill>
+                  <a:schemeClr val="tx1"/>
+                </a:solidFill>
+                <a:latin typeface="Arial"/>
+                <a:cs typeface="Arial"/>
+              </a:rPr>
+              <a:t>Core:</a:t>
+            </a:r>
+            <a:endParaRPr lang="pt-BR" sz="4000" b="1" kern="0" spc="180" dirty="0">
+              <a:solidFill>
+                <a:schemeClr val="tx1"/>
+              </a:solidFill>
+              <a:latin typeface="Arial"/>
+              <a:cs typeface="Arial"/>
+            </a:endParaRPr>
           </a:p>
           <a:p>
             <a:pPr marL="584200" indent="-571500" algn="just">
@@ -4583,17 +4610,7 @@
                 <a:latin typeface="Arial"/>
                 <a:cs typeface="Arial"/>
               </a:rPr>
-              <a:t>está </a:t>
-            </a:r>
-            <a:r>
-              <a:rPr lang="pt-BR" sz="4000" b="1" kern="0" spc="180" smtClean="0">
-                <a:solidFill>
-                  <a:schemeClr val="tx1"/>
-                </a:solidFill>
-                <a:latin typeface="Arial"/>
-                <a:cs typeface="Arial"/>
-              </a:rPr>
-              <a:t>junto </a:t>
+              <a:t>está junto </a:t>
             </a:r>
             <a:r>
               <a:rPr lang="pt-BR" sz="4000" b="1" kern="0" spc="180" dirty="0" smtClean="0">

</xml_diff>